<commit_message>
Presentation 80% and Level 1 drawing
</commit_message>
<xml_diff>
--- a/Design/DDR4 Simulation Presentation.pptx
+++ b/Design/DDR4 Simulation Presentation.pptx
@@ -13,6 +13,7 @@
     <p:sldId id="261" r:id="rId7"/>
     <p:sldId id="262" r:id="rId8"/>
     <p:sldId id="263" r:id="rId9"/>
+    <p:sldId id="264" r:id="rId10"/>
   </p:sldIdLst>
   <p:sldSz cx="12192000" cy="6858000"/>
   <p:notesSz cx="6858000" cy="9144000"/>
@@ -111,6 +112,11 @@
       </a:defRPr>
     </a:lvl9pPr>
   </p:defaultTextStyle>
+  <p:extLst>
+    <p:ext uri="{EFAFB233-063F-42B5-8137-9DF3F51BA10A}">
+      <p15:sldGuideLst xmlns:p15="http://schemas.microsoft.com/office/powerpoint/2012/main"/>
+    </p:ext>
+  </p:extLst>
 </p:presentation>
 </file>
 
@@ -171,7 +177,7 @@
           <a:noFill/>
           <a:extLst>
             <a:ext uri="{909E8E84-426E-40dd-AFC4-6F175D3DCCD1}">
-              <a14:hiddenFill xmlns:a14="http://schemas.microsoft.com/office/drawing/2010/main" xmlns="">
+              <a14:hiddenFill xmlns="" xmlns:a14="http://schemas.microsoft.com/office/drawing/2010/main">
                 <a:solidFill>
                   <a:srgbClr val="FFFFFF"/>
                 </a:solidFill>
@@ -231,7 +237,7 @@
             </a:ln>
             <a:extLst>
               <a:ext uri="{91240B29-F687-4f45-9708-019B960494DF}">
-                <a14:hiddenLine xmlns:a14="http://schemas.microsoft.com/office/drawing/2010/main" xmlns="" w="9525">
+                <a14:hiddenLine xmlns="" xmlns:a14="http://schemas.microsoft.com/office/drawing/2010/main" w="9525">
                   <a:solidFill>
                     <a:srgbClr val="000000"/>
                   </a:solidFill>
@@ -321,7 +327,7 @@
             </a:ln>
             <a:extLst>
               <a:ext uri="{91240B29-F687-4f45-9708-019B960494DF}">
-                <a14:hiddenLine xmlns:a14="http://schemas.microsoft.com/office/drawing/2010/main" xmlns="" w="9525">
+                <a14:hiddenLine xmlns="" xmlns:a14="http://schemas.microsoft.com/office/drawing/2010/main" w="9525">
                   <a:solidFill>
                     <a:srgbClr val="000000"/>
                   </a:solidFill>
@@ -411,7 +417,7 @@
             </a:ln>
             <a:extLst>
               <a:ext uri="{91240B29-F687-4f45-9708-019B960494DF}">
-                <a14:hiddenLine xmlns:a14="http://schemas.microsoft.com/office/drawing/2010/main" xmlns="" w="9525">
+                <a14:hiddenLine xmlns="" xmlns:a14="http://schemas.microsoft.com/office/drawing/2010/main" w="9525">
                   <a:solidFill>
                     <a:srgbClr val="000000"/>
                   </a:solidFill>
@@ -445,7 +451,7 @@
             </a:ln>
             <a:extLst>
               <a:ext uri="{91240B29-F687-4f45-9708-019B960494DF}">
-                <a14:hiddenLine xmlns:a14="http://schemas.microsoft.com/office/drawing/2010/main" xmlns="" w="9525">
+                <a14:hiddenLine xmlns="" xmlns:a14="http://schemas.microsoft.com/office/drawing/2010/main" w="9525">
                   <a:solidFill>
                     <a:srgbClr val="000000"/>
                   </a:solidFill>
@@ -535,7 +541,7 @@
             </a:ln>
             <a:extLst>
               <a:ext uri="{91240B29-F687-4f45-9708-019B960494DF}">
-                <a14:hiddenLine xmlns:a14="http://schemas.microsoft.com/office/drawing/2010/main" xmlns="" w="9525">
+                <a14:hiddenLine xmlns="" xmlns:a14="http://schemas.microsoft.com/office/drawing/2010/main" w="9525">
                   <a:solidFill>
                     <a:srgbClr val="000000"/>
                   </a:solidFill>
@@ -597,7 +603,7 @@
             </a:ln>
             <a:extLst>
               <a:ext uri="{91240B29-F687-4f45-9708-019B960494DF}">
-                <a14:hiddenLine xmlns:a14="http://schemas.microsoft.com/office/drawing/2010/main" xmlns="" w="9525">
+                <a14:hiddenLine xmlns="" xmlns:a14="http://schemas.microsoft.com/office/drawing/2010/main" w="9525">
                   <a:solidFill>
                     <a:srgbClr val="000000"/>
                   </a:solidFill>
@@ -659,7 +665,7 @@
             </a:ln>
             <a:extLst>
               <a:ext uri="{91240B29-F687-4f45-9708-019B960494DF}">
-                <a14:hiddenLine xmlns:a14="http://schemas.microsoft.com/office/drawing/2010/main" xmlns="" w="9525">
+                <a14:hiddenLine xmlns="" xmlns:a14="http://schemas.microsoft.com/office/drawing/2010/main" w="9525">
                   <a:solidFill>
                     <a:srgbClr val="000000"/>
                   </a:solidFill>
@@ -749,7 +755,7 @@
             </a:ln>
             <a:extLst>
               <a:ext uri="{91240B29-F687-4f45-9708-019B960494DF}">
-                <a14:hiddenLine xmlns:a14="http://schemas.microsoft.com/office/drawing/2010/main" xmlns="" w="9525">
+                <a14:hiddenLine xmlns="" xmlns:a14="http://schemas.microsoft.com/office/drawing/2010/main" w="9525">
                   <a:solidFill>
                     <a:srgbClr val="000000"/>
                   </a:solidFill>
@@ -811,7 +817,7 @@
             </a:ln>
             <a:extLst>
               <a:ext uri="{91240B29-F687-4f45-9708-019B960494DF}">
-                <a14:hiddenLine xmlns:a14="http://schemas.microsoft.com/office/drawing/2010/main" xmlns="" w="9525">
+                <a14:hiddenLine xmlns="" xmlns:a14="http://schemas.microsoft.com/office/drawing/2010/main" w="9525">
                   <a:solidFill>
                     <a:srgbClr val="000000"/>
                   </a:solidFill>
@@ -873,7 +879,7 @@
             </a:ln>
             <a:extLst>
               <a:ext uri="{91240B29-F687-4f45-9708-019B960494DF}">
-                <a14:hiddenLine xmlns:a14="http://schemas.microsoft.com/office/drawing/2010/main" xmlns="" w="9525">
+                <a14:hiddenLine xmlns="" xmlns:a14="http://schemas.microsoft.com/office/drawing/2010/main" w="9525">
                   <a:solidFill>
                     <a:srgbClr val="000000"/>
                   </a:solidFill>
@@ -963,7 +969,7 @@
             </a:ln>
             <a:extLst>
               <a:ext uri="{91240B29-F687-4f45-9708-019B960494DF}">
-                <a14:hiddenLine xmlns:a14="http://schemas.microsoft.com/office/drawing/2010/main" xmlns="" w="9525">
+                <a14:hiddenLine xmlns="" xmlns:a14="http://schemas.microsoft.com/office/drawing/2010/main" w="9525">
                   <a:solidFill>
                     <a:srgbClr val="000000"/>
                   </a:solidFill>
@@ -1053,7 +1059,7 @@
             </a:ln>
             <a:extLst>
               <a:ext uri="{91240B29-F687-4f45-9708-019B960494DF}">
-                <a14:hiddenLine xmlns:a14="http://schemas.microsoft.com/office/drawing/2010/main" xmlns="" w="9525">
+                <a14:hiddenLine xmlns="" xmlns:a14="http://schemas.microsoft.com/office/drawing/2010/main" w="9525">
                   <a:solidFill>
                     <a:srgbClr val="000000"/>
                   </a:solidFill>
@@ -1115,7 +1121,7 @@
             </a:ln>
             <a:extLst>
               <a:ext uri="{91240B29-F687-4f45-9708-019B960494DF}">
-                <a14:hiddenLine xmlns:a14="http://schemas.microsoft.com/office/drawing/2010/main" xmlns="" w="9525">
+                <a14:hiddenLine xmlns="" xmlns:a14="http://schemas.microsoft.com/office/drawing/2010/main" w="9525">
                   <a:solidFill>
                     <a:srgbClr val="000000"/>
                   </a:solidFill>
@@ -1225,7 +1231,7 @@
             </a:ln>
             <a:extLst>
               <a:ext uri="{91240B29-F687-4f45-9708-019B960494DF}">
-                <a14:hiddenLine xmlns:a14="http://schemas.microsoft.com/office/drawing/2010/main" xmlns="" w="9525">
+                <a14:hiddenLine xmlns="" xmlns:a14="http://schemas.microsoft.com/office/drawing/2010/main" w="9525">
                   <a:solidFill>
                     <a:srgbClr val="000000"/>
                   </a:solidFill>
@@ -1287,7 +1293,7 @@
             </a:ln>
             <a:extLst>
               <a:ext uri="{91240B29-F687-4f45-9708-019B960494DF}">
-                <a14:hiddenLine xmlns:a14="http://schemas.microsoft.com/office/drawing/2010/main" xmlns="" w="9525">
+                <a14:hiddenLine xmlns="" xmlns:a14="http://schemas.microsoft.com/office/drawing/2010/main" w="9525">
                   <a:solidFill>
                     <a:srgbClr val="000000"/>
                   </a:solidFill>
@@ -1377,7 +1383,7 @@
             </a:ln>
             <a:extLst>
               <a:ext uri="{91240B29-F687-4f45-9708-019B960494DF}">
-                <a14:hiddenLine xmlns:a14="http://schemas.microsoft.com/office/drawing/2010/main" xmlns="" w="9525">
+                <a14:hiddenLine xmlns="" xmlns:a14="http://schemas.microsoft.com/office/drawing/2010/main" w="9525">
                   <a:solidFill>
                     <a:srgbClr val="000000"/>
                   </a:solidFill>
@@ -1467,7 +1473,7 @@
             </a:ln>
             <a:extLst>
               <a:ext uri="{91240B29-F687-4f45-9708-019B960494DF}">
-                <a14:hiddenLine xmlns:a14="http://schemas.microsoft.com/office/drawing/2010/main" xmlns="" w="9525">
+                <a14:hiddenLine xmlns="" xmlns:a14="http://schemas.microsoft.com/office/drawing/2010/main" w="9525">
                   <a:solidFill>
                     <a:srgbClr val="000000"/>
                   </a:solidFill>
@@ -1529,7 +1535,7 @@
             </a:ln>
             <a:extLst>
               <a:ext uri="{91240B29-F687-4f45-9708-019B960494DF}">
-                <a14:hiddenLine xmlns:a14="http://schemas.microsoft.com/office/drawing/2010/main" xmlns="" w="9525">
+                <a14:hiddenLine xmlns="" xmlns:a14="http://schemas.microsoft.com/office/drawing/2010/main" w="9525">
                   <a:solidFill>
                     <a:srgbClr val="000000"/>
                   </a:solidFill>
@@ -1619,7 +1625,7 @@
             </a:ln>
             <a:extLst>
               <a:ext uri="{91240B29-F687-4f45-9708-019B960494DF}">
-                <a14:hiddenLine xmlns:a14="http://schemas.microsoft.com/office/drawing/2010/main" xmlns="" w="9525">
+                <a14:hiddenLine xmlns="" xmlns:a14="http://schemas.microsoft.com/office/drawing/2010/main" w="9525">
                   <a:solidFill>
                     <a:srgbClr val="000000"/>
                   </a:solidFill>
@@ -1709,7 +1715,7 @@
             </a:ln>
             <a:extLst>
               <a:ext uri="{91240B29-F687-4f45-9708-019B960494DF}">
-                <a14:hiddenLine xmlns:a14="http://schemas.microsoft.com/office/drawing/2010/main" xmlns="" w="9525">
+                <a14:hiddenLine xmlns="" xmlns:a14="http://schemas.microsoft.com/office/drawing/2010/main" w="9525">
                   <a:solidFill>
                     <a:srgbClr val="000000"/>
                   </a:solidFill>
@@ -1765,7 +1771,7 @@
             </a:ln>
             <a:extLst>
               <a:ext uri="{91240B29-F687-4f45-9708-019B960494DF}">
-                <a14:hiddenLine xmlns:a14="http://schemas.microsoft.com/office/drawing/2010/main" xmlns="" w="9525">
+                <a14:hiddenLine xmlns="" xmlns:a14="http://schemas.microsoft.com/office/drawing/2010/main" w="9525">
                   <a:solidFill>
                     <a:srgbClr val="000000"/>
                   </a:solidFill>
@@ -1855,7 +1861,7 @@
             </a:ln>
             <a:extLst>
               <a:ext uri="{91240B29-F687-4f45-9708-019B960494DF}">
-                <a14:hiddenLine xmlns:a14="http://schemas.microsoft.com/office/drawing/2010/main" xmlns="" w="9525">
+                <a14:hiddenLine xmlns="" xmlns:a14="http://schemas.microsoft.com/office/drawing/2010/main" w="9525">
                   <a:solidFill>
                     <a:srgbClr val="000000"/>
                   </a:solidFill>
@@ -1911,7 +1917,7 @@
             </a:ln>
             <a:extLst>
               <a:ext uri="{91240B29-F687-4f45-9708-019B960494DF}">
-                <a14:hiddenLine xmlns:a14="http://schemas.microsoft.com/office/drawing/2010/main" xmlns="" w="9525">
+                <a14:hiddenLine xmlns="" xmlns:a14="http://schemas.microsoft.com/office/drawing/2010/main" w="9525">
                   <a:solidFill>
                     <a:srgbClr val="000000"/>
                   </a:solidFill>
@@ -2001,7 +2007,7 @@
             </a:ln>
             <a:extLst>
               <a:ext uri="{91240B29-F687-4f45-9708-019B960494DF}">
-                <a14:hiddenLine xmlns:a14="http://schemas.microsoft.com/office/drawing/2010/main" xmlns="" w="9525">
+                <a14:hiddenLine xmlns="" xmlns:a14="http://schemas.microsoft.com/office/drawing/2010/main" w="9525">
                   <a:solidFill>
                     <a:srgbClr val="000000"/>
                   </a:solidFill>
@@ -2069,7 +2075,7 @@
             </a:ln>
             <a:extLst>
               <a:ext uri="{91240B29-F687-4f45-9708-019B960494DF}">
-                <a14:hiddenLine xmlns:a14="http://schemas.microsoft.com/office/drawing/2010/main" xmlns="" w="9525">
+                <a14:hiddenLine xmlns="" xmlns:a14="http://schemas.microsoft.com/office/drawing/2010/main" w="9525">
                   <a:solidFill>
                     <a:srgbClr val="000000"/>
                   </a:solidFill>
@@ -2159,7 +2165,7 @@
             </a:ln>
             <a:extLst>
               <a:ext uri="{91240B29-F687-4f45-9708-019B960494DF}">
-                <a14:hiddenLine xmlns:a14="http://schemas.microsoft.com/office/drawing/2010/main" xmlns="" w="9525">
+                <a14:hiddenLine xmlns="" xmlns:a14="http://schemas.microsoft.com/office/drawing/2010/main" w="9525">
                   <a:solidFill>
                     <a:srgbClr val="000000"/>
                   </a:solidFill>
@@ -2227,7 +2233,7 @@
             </a:ln>
             <a:extLst>
               <a:ext uri="{91240B29-F687-4f45-9708-019B960494DF}">
-                <a14:hiddenLine xmlns:a14="http://schemas.microsoft.com/office/drawing/2010/main" xmlns="" w="9525">
+                <a14:hiddenLine xmlns="" xmlns:a14="http://schemas.microsoft.com/office/drawing/2010/main" w="9525">
                   <a:solidFill>
                     <a:srgbClr val="000000"/>
                   </a:solidFill>
@@ -2317,7 +2323,7 @@
             </a:ln>
             <a:extLst>
               <a:ext uri="{91240B29-F687-4f45-9708-019B960494DF}">
-                <a14:hiddenLine xmlns:a14="http://schemas.microsoft.com/office/drawing/2010/main" xmlns="" w="9525">
+                <a14:hiddenLine xmlns="" xmlns:a14="http://schemas.microsoft.com/office/drawing/2010/main" w="9525">
                   <a:solidFill>
                     <a:srgbClr val="000000"/>
                   </a:solidFill>
@@ -2351,7 +2357,7 @@
             </a:ln>
             <a:extLst>
               <a:ext uri="{91240B29-F687-4f45-9708-019B960494DF}">
-                <a14:hiddenLine xmlns:a14="http://schemas.microsoft.com/office/drawing/2010/main" xmlns="" w="9525">
+                <a14:hiddenLine xmlns="" xmlns:a14="http://schemas.microsoft.com/office/drawing/2010/main" w="9525">
                   <a:solidFill>
                     <a:srgbClr val="000000"/>
                   </a:solidFill>
@@ -2441,7 +2447,7 @@
             </a:ln>
             <a:extLst>
               <a:ext uri="{91240B29-F687-4f45-9708-019B960494DF}">
-                <a14:hiddenLine xmlns:a14="http://schemas.microsoft.com/office/drawing/2010/main" xmlns="" w="9525">
+                <a14:hiddenLine xmlns="" xmlns:a14="http://schemas.microsoft.com/office/drawing/2010/main" w="9525">
                   <a:solidFill>
                     <a:srgbClr val="000000"/>
                   </a:solidFill>
@@ -2503,7 +2509,7 @@
             </a:ln>
             <a:extLst>
               <a:ext uri="{91240B29-F687-4f45-9708-019B960494DF}">
-                <a14:hiddenLine xmlns:a14="http://schemas.microsoft.com/office/drawing/2010/main" xmlns="" w="9525">
+                <a14:hiddenLine xmlns="" xmlns:a14="http://schemas.microsoft.com/office/drawing/2010/main" w="9525">
                   <a:solidFill>
                     <a:srgbClr val="000000"/>
                   </a:solidFill>
@@ -2565,7 +2571,7 @@
             </a:ln>
             <a:extLst>
               <a:ext uri="{91240B29-F687-4f45-9708-019B960494DF}">
-                <a14:hiddenLine xmlns:a14="http://schemas.microsoft.com/office/drawing/2010/main" xmlns="" w="9525">
+                <a14:hiddenLine xmlns="" xmlns:a14="http://schemas.microsoft.com/office/drawing/2010/main" w="9525">
                   <a:solidFill>
                     <a:srgbClr val="000000"/>
                   </a:solidFill>
@@ -2655,7 +2661,7 @@
             </a:ln>
             <a:extLst>
               <a:ext uri="{91240B29-F687-4f45-9708-019B960494DF}">
-                <a14:hiddenLine xmlns:a14="http://schemas.microsoft.com/office/drawing/2010/main" xmlns="" w="9525">
+                <a14:hiddenLine xmlns="" xmlns:a14="http://schemas.microsoft.com/office/drawing/2010/main" w="9525">
                   <a:solidFill>
                     <a:srgbClr val="000000"/>
                   </a:solidFill>
@@ -2723,7 +2729,7 @@
             </a:ln>
             <a:extLst>
               <a:ext uri="{91240B29-F687-4f45-9708-019B960494DF}">
-                <a14:hiddenLine xmlns:a14="http://schemas.microsoft.com/office/drawing/2010/main" xmlns="" w="9525">
+                <a14:hiddenLine xmlns="" xmlns:a14="http://schemas.microsoft.com/office/drawing/2010/main" w="9525">
                   <a:solidFill>
                     <a:srgbClr val="000000"/>
                   </a:solidFill>
@@ -2785,7 +2791,7 @@
             </a:ln>
             <a:extLst>
               <a:ext uri="{91240B29-F687-4f45-9708-019B960494DF}">
-                <a14:hiddenLine xmlns:a14="http://schemas.microsoft.com/office/drawing/2010/main" xmlns="" w="9525">
+                <a14:hiddenLine xmlns="" xmlns:a14="http://schemas.microsoft.com/office/drawing/2010/main" w="9525">
                   <a:solidFill>
                     <a:srgbClr val="000000"/>
                   </a:solidFill>
@@ -2875,7 +2881,7 @@
             </a:ln>
             <a:extLst>
               <a:ext uri="{91240B29-F687-4f45-9708-019B960494DF}">
-                <a14:hiddenLine xmlns:a14="http://schemas.microsoft.com/office/drawing/2010/main" xmlns="" w="9525">
+                <a14:hiddenLine xmlns="" xmlns:a14="http://schemas.microsoft.com/office/drawing/2010/main" w="9525">
                   <a:solidFill>
                     <a:srgbClr val="000000"/>
                   </a:solidFill>
@@ -2937,7 +2943,7 @@
             </a:ln>
             <a:extLst>
               <a:ext uri="{91240B29-F687-4f45-9708-019B960494DF}">
-                <a14:hiddenLine xmlns:a14="http://schemas.microsoft.com/office/drawing/2010/main" xmlns="" w="9525">
+                <a14:hiddenLine xmlns="" xmlns:a14="http://schemas.microsoft.com/office/drawing/2010/main" w="9525">
                   <a:solidFill>
                     <a:srgbClr val="000000"/>
                   </a:solidFill>
@@ -3027,7 +3033,7 @@
             </a:ln>
             <a:extLst>
               <a:ext uri="{91240B29-F687-4f45-9708-019B960494DF}">
-                <a14:hiddenLine xmlns:a14="http://schemas.microsoft.com/office/drawing/2010/main" xmlns="" w="9525">
+                <a14:hiddenLine xmlns="" xmlns:a14="http://schemas.microsoft.com/office/drawing/2010/main" w="9525">
                   <a:solidFill>
                     <a:srgbClr val="000000"/>
                   </a:solidFill>
@@ -3089,7 +3095,7 @@
             </a:ln>
             <a:extLst>
               <a:ext uri="{91240B29-F687-4f45-9708-019B960494DF}">
-                <a14:hiddenLine xmlns:a14="http://schemas.microsoft.com/office/drawing/2010/main" xmlns="" w="9525">
+                <a14:hiddenLine xmlns="" xmlns:a14="http://schemas.microsoft.com/office/drawing/2010/main" w="9525">
                   <a:solidFill>
                     <a:srgbClr val="000000"/>
                   </a:solidFill>
@@ -3179,7 +3185,7 @@
             </a:ln>
             <a:extLst>
               <a:ext uri="{91240B29-F687-4f45-9708-019B960494DF}">
-                <a14:hiddenLine xmlns:a14="http://schemas.microsoft.com/office/drawing/2010/main" xmlns="" w="9525">
+                <a14:hiddenLine xmlns="" xmlns:a14="http://schemas.microsoft.com/office/drawing/2010/main" w="9525">
                   <a:solidFill>
                     <a:srgbClr val="000000"/>
                   </a:solidFill>
@@ -3213,7 +3219,7 @@
             </a:ln>
             <a:extLst>
               <a:ext uri="{91240B29-F687-4f45-9708-019B960494DF}">
-                <a14:hiddenLine xmlns:a14="http://schemas.microsoft.com/office/drawing/2010/main" xmlns="" w="9525">
+                <a14:hiddenLine xmlns="" xmlns:a14="http://schemas.microsoft.com/office/drawing/2010/main" w="9525">
                   <a:solidFill>
                     <a:srgbClr val="000000"/>
                   </a:solidFill>
@@ -3278,7 +3284,7 @@
             </a:ln>
             <a:extLst>
               <a:ext uri="{91240B29-F687-4f45-9708-019B960494DF}">
-                <a14:hiddenLine xmlns:a14="http://schemas.microsoft.com/office/drawing/2010/main" xmlns="" w="9525">
+                <a14:hiddenLine xmlns="" xmlns:a14="http://schemas.microsoft.com/office/drawing/2010/main" w="9525">
                   <a:solidFill>
                     <a:srgbClr val="000000"/>
                   </a:solidFill>
@@ -3368,7 +3374,7 @@
             </a:ln>
             <a:extLst>
               <a:ext uri="{91240B29-F687-4f45-9708-019B960494DF}">
-                <a14:hiddenLine xmlns:a14="http://schemas.microsoft.com/office/drawing/2010/main" xmlns="" w="9525">
+                <a14:hiddenLine xmlns="" xmlns:a14="http://schemas.microsoft.com/office/drawing/2010/main" w="9525">
                   <a:solidFill>
                     <a:srgbClr val="000000"/>
                   </a:solidFill>
@@ -3430,7 +3436,7 @@
             </a:ln>
             <a:extLst>
               <a:ext uri="{91240B29-F687-4f45-9708-019B960494DF}">
-                <a14:hiddenLine xmlns:a14="http://schemas.microsoft.com/office/drawing/2010/main" xmlns="" w="9525">
+                <a14:hiddenLine xmlns="" xmlns:a14="http://schemas.microsoft.com/office/drawing/2010/main" w="9525">
                   <a:solidFill>
                     <a:srgbClr val="000000"/>
                   </a:solidFill>
@@ -3520,7 +3526,7 @@
             </a:ln>
             <a:extLst>
               <a:ext uri="{91240B29-F687-4f45-9708-019B960494DF}">
-                <a14:hiddenLine xmlns:a14="http://schemas.microsoft.com/office/drawing/2010/main" xmlns="" w="9525">
+                <a14:hiddenLine xmlns="" xmlns:a14="http://schemas.microsoft.com/office/drawing/2010/main" w="9525">
                   <a:solidFill>
                     <a:srgbClr val="000000"/>
                   </a:solidFill>
@@ -3610,7 +3616,7 @@
             </a:ln>
             <a:extLst>
               <a:ext uri="{91240B29-F687-4f45-9708-019B960494DF}">
-                <a14:hiddenLine xmlns:a14="http://schemas.microsoft.com/office/drawing/2010/main" xmlns="" w="9525">
+                <a14:hiddenLine xmlns="" xmlns:a14="http://schemas.microsoft.com/office/drawing/2010/main" w="9525">
                   <a:solidFill>
                     <a:srgbClr val="000000"/>
                   </a:solidFill>
@@ -3675,7 +3681,7 @@
             </a:ln>
             <a:extLst>
               <a:ext uri="{91240B29-F687-4f45-9708-019B960494DF}">
-                <a14:hiddenLine xmlns:a14="http://schemas.microsoft.com/office/drawing/2010/main" xmlns="" w="9525">
+                <a14:hiddenLine xmlns="" xmlns:a14="http://schemas.microsoft.com/office/drawing/2010/main" w="9525">
                   <a:solidFill>
                     <a:srgbClr val="000000"/>
                   </a:solidFill>
@@ -3737,7 +3743,7 @@
             </a:ln>
             <a:extLst>
               <a:ext uri="{91240B29-F687-4f45-9708-019B960494DF}">
-                <a14:hiddenLine xmlns:a14="http://schemas.microsoft.com/office/drawing/2010/main" xmlns="" w="9525">
+                <a14:hiddenLine xmlns="" xmlns:a14="http://schemas.microsoft.com/office/drawing/2010/main" w="9525">
                   <a:solidFill>
                     <a:srgbClr val="000000"/>
                   </a:solidFill>
@@ -3827,7 +3833,7 @@
             </a:ln>
             <a:extLst>
               <a:ext uri="{91240B29-F687-4f45-9708-019B960494DF}">
-                <a14:hiddenLine xmlns:a14="http://schemas.microsoft.com/office/drawing/2010/main" xmlns="" w="9525">
+                <a14:hiddenLine xmlns="" xmlns:a14="http://schemas.microsoft.com/office/drawing/2010/main" w="9525">
                   <a:solidFill>
                     <a:srgbClr val="000000"/>
                   </a:solidFill>
@@ -3917,7 +3923,7 @@
             </a:ln>
             <a:extLst>
               <a:ext uri="{91240B29-F687-4f45-9708-019B960494DF}">
-                <a14:hiddenLine xmlns:a14="http://schemas.microsoft.com/office/drawing/2010/main" xmlns="" w="9525">
+                <a14:hiddenLine xmlns="" xmlns:a14="http://schemas.microsoft.com/office/drawing/2010/main" w="9525">
                   <a:solidFill>
                     <a:srgbClr val="000000"/>
                   </a:solidFill>
@@ -3979,7 +3985,7 @@
             </a:ln>
             <a:extLst>
               <a:ext uri="{91240B29-F687-4f45-9708-019B960494DF}">
-                <a14:hiddenLine xmlns:a14="http://schemas.microsoft.com/office/drawing/2010/main" xmlns="" w="9525">
+                <a14:hiddenLine xmlns="" xmlns:a14="http://schemas.microsoft.com/office/drawing/2010/main" w="9525">
                   <a:solidFill>
                     <a:srgbClr val="000000"/>
                   </a:solidFill>
@@ -4099,7 +4105,7 @@
             </a:ln>
             <a:extLst>
               <a:ext uri="{91240B29-F687-4f45-9708-019B960494DF}">
-                <a14:hiddenLine xmlns:a14="http://schemas.microsoft.com/office/drawing/2010/main" xmlns="" w="9525">
+                <a14:hiddenLine xmlns="" xmlns:a14="http://schemas.microsoft.com/office/drawing/2010/main" w="9525">
                   <a:solidFill>
                     <a:srgbClr val="000000"/>
                   </a:solidFill>
@@ -4167,7 +4173,7 @@
             </a:ln>
             <a:extLst>
               <a:ext uri="{91240B29-F687-4f45-9708-019B960494DF}">
-                <a14:hiddenLine xmlns:a14="http://schemas.microsoft.com/office/drawing/2010/main" xmlns="" w="9525">
+                <a14:hiddenLine xmlns="" xmlns:a14="http://schemas.microsoft.com/office/drawing/2010/main" w="9525">
                   <a:solidFill>
                     <a:srgbClr val="000000"/>
                   </a:solidFill>
@@ -4257,7 +4263,7 @@
             </a:ln>
             <a:extLst>
               <a:ext uri="{91240B29-F687-4f45-9708-019B960494DF}">
-                <a14:hiddenLine xmlns:a14="http://schemas.microsoft.com/office/drawing/2010/main" xmlns="" w="9525">
+                <a14:hiddenLine xmlns="" xmlns:a14="http://schemas.microsoft.com/office/drawing/2010/main" w="9525">
                   <a:solidFill>
                     <a:srgbClr val="000000"/>
                   </a:solidFill>
@@ -4397,7 +4403,7 @@
           <a:p>
             <a:fld id="{48A87A34-81AB-432B-8DAE-1953F412C126}" type="datetimeFigureOut">
               <a:rPr lang="en-US" dirty="0"/>
-              <a:t>8/11/2014</a:t>
+              <a:t>8/12/2014</a:t>
             </a:fld>
             <a:endParaRPr lang="en-US" dirty="0"/>
           </a:p>
@@ -4659,7 +4665,7 @@
           <a:p>
             <a:fld id="{48A87A34-81AB-432B-8DAE-1953F412C126}" type="datetimeFigureOut">
               <a:rPr lang="en-US" dirty="0"/>
-              <a:t>8/11/2014</a:t>
+              <a:t>8/12/2014</a:t>
             </a:fld>
             <a:endParaRPr lang="en-US" dirty="0"/>
           </a:p>
@@ -4850,7 +4856,7 @@
           <a:p>
             <a:fld id="{48A87A34-81AB-432B-8DAE-1953F412C126}" type="datetimeFigureOut">
               <a:rPr lang="en-US" dirty="0"/>
-              <a:t>8/11/2014</a:t>
+              <a:t>8/12/2014</a:t>
             </a:fld>
             <a:endParaRPr lang="en-US" dirty="0"/>
           </a:p>
@@ -5108,7 +5114,7 @@
           <a:p>
             <a:fld id="{48A87A34-81AB-432B-8DAE-1953F412C126}" type="datetimeFigureOut">
               <a:rPr lang="en-US" dirty="0"/>
-              <a:t>8/11/2014</a:t>
+              <a:t>8/12/2014</a:t>
             </a:fld>
             <a:endParaRPr lang="en-US" dirty="0"/>
           </a:p>
@@ -5537,7 +5543,7 @@
           <a:p>
             <a:fld id="{48A87A34-81AB-432B-8DAE-1953F412C126}" type="datetimeFigureOut">
               <a:rPr lang="en-US" dirty="0"/>
-              <a:t>8/11/2014</a:t>
+              <a:t>8/12/2014</a:t>
             </a:fld>
             <a:endParaRPr lang="en-US" dirty="0"/>
           </a:p>
@@ -6078,7 +6084,7 @@
           <a:p>
             <a:fld id="{48A87A34-81AB-432B-8DAE-1953F412C126}" type="datetimeFigureOut">
               <a:rPr lang="en-US" dirty="0"/>
-              <a:t>8/11/2014</a:t>
+              <a:t>8/12/2014</a:t>
             </a:fld>
             <a:endParaRPr lang="en-US" dirty="0"/>
           </a:p>
@@ -6793,7 +6799,7 @@
           <a:p>
             <a:fld id="{48A87A34-81AB-432B-8DAE-1953F412C126}" type="datetimeFigureOut">
               <a:rPr lang="en-US" dirty="0"/>
-              <a:t>8/11/2014</a:t>
+              <a:t>8/12/2014</a:t>
             </a:fld>
             <a:endParaRPr lang="en-US" dirty="0"/>
           </a:p>
@@ -6958,7 +6964,7 @@
           <a:p>
             <a:fld id="{48A87A34-81AB-432B-8DAE-1953F412C126}" type="datetimeFigureOut">
               <a:rPr lang="en-US" dirty="0"/>
-              <a:t>8/11/2014</a:t>
+              <a:t>8/12/2014</a:t>
             </a:fld>
             <a:endParaRPr lang="en-US" dirty="0"/>
           </a:p>
@@ -7133,7 +7139,7 @@
           <a:p>
             <a:fld id="{48A87A34-81AB-432B-8DAE-1953F412C126}" type="datetimeFigureOut">
               <a:rPr lang="en-US" dirty="0"/>
-              <a:t>8/11/2014</a:t>
+              <a:t>8/12/2014</a:t>
             </a:fld>
             <a:endParaRPr lang="en-US" dirty="0"/>
           </a:p>
@@ -7298,7 +7304,7 @@
           <a:p>
             <a:fld id="{48A87A34-81AB-432B-8DAE-1953F412C126}" type="datetimeFigureOut">
               <a:rPr lang="en-US" dirty="0"/>
-              <a:t>8/11/2014</a:t>
+              <a:t>8/12/2014</a:t>
             </a:fld>
             <a:endParaRPr lang="en-US" dirty="0"/>
           </a:p>
@@ -7543,7 +7549,7 @@
           <a:p>
             <a:fld id="{48A87A34-81AB-432B-8DAE-1953F412C126}" type="datetimeFigureOut">
               <a:rPr lang="en-US" dirty="0"/>
-              <a:t>8/11/2014</a:t>
+              <a:t>8/12/2014</a:t>
             </a:fld>
             <a:endParaRPr lang="en-US" dirty="0"/>
           </a:p>
@@ -7770,7 +7776,7 @@
           <a:p>
             <a:fld id="{48A87A34-81AB-432B-8DAE-1953F412C126}" type="datetimeFigureOut">
               <a:rPr lang="en-US" dirty="0"/>
-              <a:t>8/11/2014</a:t>
+              <a:t>8/12/2014</a:t>
             </a:fld>
             <a:endParaRPr lang="en-US" dirty="0"/>
           </a:p>
@@ -8146,7 +8152,7 @@
           <a:p>
             <a:fld id="{48A87A34-81AB-432B-8DAE-1953F412C126}" type="datetimeFigureOut">
               <a:rPr lang="en-US" dirty="0"/>
-              <a:t>8/11/2014</a:t>
+              <a:t>8/12/2014</a:t>
             </a:fld>
             <a:endParaRPr lang="en-US" dirty="0"/>
           </a:p>
@@ -8259,7 +8265,7 @@
           <a:p>
             <a:fld id="{48A87A34-81AB-432B-8DAE-1953F412C126}" type="datetimeFigureOut">
               <a:rPr lang="en-US" dirty="0"/>
-              <a:t>8/11/2014</a:t>
+              <a:t>8/12/2014</a:t>
             </a:fld>
             <a:endParaRPr lang="en-US" dirty="0"/>
           </a:p>
@@ -8349,7 +8355,7 @@
           <a:p>
             <a:fld id="{48A87A34-81AB-432B-8DAE-1953F412C126}" type="datetimeFigureOut">
               <a:rPr lang="en-US" dirty="0"/>
-              <a:t>8/11/2014</a:t>
+              <a:t>8/12/2014</a:t>
             </a:fld>
             <a:endParaRPr lang="en-US" dirty="0"/>
           </a:p>
@@ -8593,7 +8599,7 @@
           <a:p>
             <a:fld id="{48A87A34-81AB-432B-8DAE-1953F412C126}" type="datetimeFigureOut">
               <a:rPr lang="en-US" dirty="0"/>
-              <a:t>8/11/2014</a:t>
+              <a:t>8/12/2014</a:t>
             </a:fld>
             <a:endParaRPr lang="en-US" dirty="0"/>
           </a:p>
@@ -8868,7 +8874,7 @@
           <a:p>
             <a:fld id="{48A87A34-81AB-432B-8DAE-1953F412C126}" type="datetimeFigureOut">
               <a:rPr lang="en-US" dirty="0"/>
-              <a:t>8/11/2014</a:t>
+              <a:t>8/12/2014</a:t>
             </a:fld>
             <a:endParaRPr lang="en-US" dirty="0"/>
           </a:p>
@@ -8986,7 +8992,7 @@
           <a:noFill/>
           <a:extLst>
             <a:ext uri="{909E8E84-426E-40dd-AFC4-6F175D3DCCD1}">
-              <a14:hiddenFill xmlns:a14="http://schemas.microsoft.com/office/drawing/2010/main" xmlns="">
+              <a14:hiddenFill xmlns="" xmlns:a14="http://schemas.microsoft.com/office/drawing/2010/main">
                 <a:solidFill>
                   <a:srgbClr val="FFFFFF"/>
                 </a:solidFill>
@@ -9060,7 +9066,7 @@
               </a:ln>
               <a:extLst>
                 <a:ext uri="{91240B29-F687-4f45-9708-019B960494DF}">
-                  <a14:hiddenLine xmlns:a14="http://schemas.microsoft.com/office/drawing/2010/main" xmlns="" w="9525">
+                  <a14:hiddenLine xmlns="" xmlns:a14="http://schemas.microsoft.com/office/drawing/2010/main" w="9525">
                     <a:solidFill>
                       <a:srgbClr val="000000"/>
                     </a:solidFill>
@@ -9150,7 +9156,7 @@
               </a:ln>
               <a:extLst>
                 <a:ext uri="{91240B29-F687-4f45-9708-019B960494DF}">
-                  <a14:hiddenLine xmlns:a14="http://schemas.microsoft.com/office/drawing/2010/main" xmlns="" w="9525">
+                  <a14:hiddenLine xmlns="" xmlns:a14="http://schemas.microsoft.com/office/drawing/2010/main" w="9525">
                     <a:solidFill>
                       <a:srgbClr val="000000"/>
                     </a:solidFill>
@@ -9240,7 +9246,7 @@
               </a:ln>
               <a:extLst>
                 <a:ext uri="{91240B29-F687-4f45-9708-019B960494DF}">
-                  <a14:hiddenLine xmlns:a14="http://schemas.microsoft.com/office/drawing/2010/main" xmlns="" w="9525">
+                  <a14:hiddenLine xmlns="" xmlns:a14="http://schemas.microsoft.com/office/drawing/2010/main" w="9525">
                     <a:solidFill>
                       <a:srgbClr val="000000"/>
                     </a:solidFill>
@@ -9302,7 +9308,7 @@
               </a:ln>
               <a:extLst>
                 <a:ext uri="{91240B29-F687-4f45-9708-019B960494DF}">
-                  <a14:hiddenLine xmlns:a14="http://schemas.microsoft.com/office/drawing/2010/main" xmlns="" w="9525">
+                  <a14:hiddenLine xmlns="" xmlns:a14="http://schemas.microsoft.com/office/drawing/2010/main" w="9525">
                     <a:solidFill>
                       <a:srgbClr val="000000"/>
                     </a:solidFill>
@@ -9392,7 +9398,7 @@
               </a:ln>
               <a:extLst>
                 <a:ext uri="{91240B29-F687-4f45-9708-019B960494DF}">
-                  <a14:hiddenLine xmlns:a14="http://schemas.microsoft.com/office/drawing/2010/main" xmlns="" w="9525">
+                  <a14:hiddenLine xmlns="" xmlns:a14="http://schemas.microsoft.com/office/drawing/2010/main" w="9525">
                     <a:solidFill>
                       <a:srgbClr val="000000"/>
                     </a:solidFill>
@@ -9454,7 +9460,7 @@
               </a:ln>
               <a:extLst>
                 <a:ext uri="{91240B29-F687-4f45-9708-019B960494DF}">
-                  <a14:hiddenLine xmlns:a14="http://schemas.microsoft.com/office/drawing/2010/main" xmlns="" w="9525">
+                  <a14:hiddenLine xmlns="" xmlns:a14="http://schemas.microsoft.com/office/drawing/2010/main" w="9525">
                     <a:solidFill>
                       <a:srgbClr val="000000"/>
                     </a:solidFill>
@@ -9516,7 +9522,7 @@
               </a:ln>
               <a:extLst>
                 <a:ext uri="{91240B29-F687-4f45-9708-019B960494DF}">
-                  <a14:hiddenLine xmlns:a14="http://schemas.microsoft.com/office/drawing/2010/main" xmlns="" w="9525">
+                  <a14:hiddenLine xmlns="" xmlns:a14="http://schemas.microsoft.com/office/drawing/2010/main" w="9525">
                     <a:solidFill>
                       <a:srgbClr val="000000"/>
                     </a:solidFill>
@@ -9606,7 +9612,7 @@
               </a:ln>
               <a:extLst>
                 <a:ext uri="{91240B29-F687-4f45-9708-019B960494DF}">
-                  <a14:hiddenLine xmlns:a14="http://schemas.microsoft.com/office/drawing/2010/main" xmlns="" w="9525">
+                  <a14:hiddenLine xmlns="" xmlns:a14="http://schemas.microsoft.com/office/drawing/2010/main" w="9525">
                     <a:solidFill>
                       <a:srgbClr val="000000"/>
                     </a:solidFill>
@@ -9696,7 +9702,7 @@
               </a:ln>
               <a:extLst>
                 <a:ext uri="{91240B29-F687-4f45-9708-019B960494DF}">
-                  <a14:hiddenLine xmlns:a14="http://schemas.microsoft.com/office/drawing/2010/main" xmlns="" w="9525">
+                  <a14:hiddenLine xmlns="" xmlns:a14="http://schemas.microsoft.com/office/drawing/2010/main" w="9525">
                     <a:solidFill>
                       <a:srgbClr val="000000"/>
                     </a:solidFill>
@@ -9758,7 +9764,7 @@
               </a:ln>
               <a:extLst>
                 <a:ext uri="{91240B29-F687-4f45-9708-019B960494DF}">
-                  <a14:hiddenLine xmlns:a14="http://schemas.microsoft.com/office/drawing/2010/main" xmlns="" w="9525">
+                  <a14:hiddenLine xmlns="" xmlns:a14="http://schemas.microsoft.com/office/drawing/2010/main" w="9525">
                     <a:solidFill>
                       <a:srgbClr val="000000"/>
                     </a:solidFill>
@@ -9868,7 +9874,7 @@
               </a:ln>
               <a:extLst>
                 <a:ext uri="{91240B29-F687-4f45-9708-019B960494DF}">
-                  <a14:hiddenLine xmlns:a14="http://schemas.microsoft.com/office/drawing/2010/main" xmlns="" w="9525">
+                  <a14:hiddenLine xmlns="" xmlns:a14="http://schemas.microsoft.com/office/drawing/2010/main" w="9525">
                     <a:solidFill>
                       <a:srgbClr val="000000"/>
                     </a:solidFill>
@@ -9952,7 +9958,7 @@
               </a:ln>
               <a:extLst>
                 <a:ext uri="{91240B29-F687-4f45-9708-019B960494DF}">
-                  <a14:hiddenLine xmlns:a14="http://schemas.microsoft.com/office/drawing/2010/main" xmlns="" w="9525">
+                  <a14:hiddenLine xmlns="" xmlns:a14="http://schemas.microsoft.com/office/drawing/2010/main" w="9525">
                     <a:solidFill>
                       <a:srgbClr val="000000"/>
                     </a:solidFill>
@@ -10014,7 +10020,7 @@
               </a:ln>
               <a:extLst>
                 <a:ext uri="{91240B29-F687-4f45-9708-019B960494DF}">
-                  <a14:hiddenLine xmlns:a14="http://schemas.microsoft.com/office/drawing/2010/main" xmlns="" w="9525">
+                  <a14:hiddenLine xmlns="" xmlns:a14="http://schemas.microsoft.com/office/drawing/2010/main" w="9525">
                     <a:solidFill>
                       <a:srgbClr val="000000"/>
                     </a:solidFill>
@@ -10076,7 +10082,7 @@
               </a:ln>
               <a:extLst>
                 <a:ext uri="{91240B29-F687-4f45-9708-019B960494DF}">
-                  <a14:hiddenLine xmlns:a14="http://schemas.microsoft.com/office/drawing/2010/main" xmlns="" w="9525">
+                  <a14:hiddenLine xmlns="" xmlns:a14="http://schemas.microsoft.com/office/drawing/2010/main" w="9525">
                     <a:solidFill>
                       <a:srgbClr val="000000"/>
                     </a:solidFill>
@@ -10166,7 +10172,7 @@
               </a:ln>
               <a:extLst>
                 <a:ext uri="{91240B29-F687-4f45-9708-019B960494DF}">
-                  <a14:hiddenLine xmlns:a14="http://schemas.microsoft.com/office/drawing/2010/main" xmlns="" w="9525">
+                  <a14:hiddenLine xmlns="" xmlns:a14="http://schemas.microsoft.com/office/drawing/2010/main" w="9525">
                     <a:solidFill>
                       <a:srgbClr val="000000"/>
                     </a:solidFill>
@@ -10200,7 +10206,7 @@
               </a:ln>
               <a:extLst>
                 <a:ext uri="{91240B29-F687-4f45-9708-019B960494DF}">
-                  <a14:hiddenLine xmlns:a14="http://schemas.microsoft.com/office/drawing/2010/main" xmlns="" w="9525">
+                  <a14:hiddenLine xmlns="" xmlns:a14="http://schemas.microsoft.com/office/drawing/2010/main" w="9525">
                     <a:solidFill>
                       <a:srgbClr val="000000"/>
                     </a:solidFill>
@@ -10265,7 +10271,7 @@
               </a:ln>
               <a:extLst>
                 <a:ext uri="{91240B29-F687-4f45-9708-019B960494DF}">
-                  <a14:hiddenLine xmlns:a14="http://schemas.microsoft.com/office/drawing/2010/main" xmlns="" w="9525">
+                  <a14:hiddenLine xmlns="" xmlns:a14="http://schemas.microsoft.com/office/drawing/2010/main" w="9525">
                     <a:solidFill>
                       <a:srgbClr val="000000"/>
                     </a:solidFill>
@@ -10355,7 +10361,7 @@
               </a:ln>
               <a:extLst>
                 <a:ext uri="{91240B29-F687-4f45-9708-019B960494DF}">
-                  <a14:hiddenLine xmlns:a14="http://schemas.microsoft.com/office/drawing/2010/main" xmlns="" w="9525">
+                  <a14:hiddenLine xmlns="" xmlns:a14="http://schemas.microsoft.com/office/drawing/2010/main" w="9525">
                     <a:solidFill>
                       <a:srgbClr val="000000"/>
                     </a:solidFill>
@@ -10417,7 +10423,7 @@
               </a:ln>
               <a:extLst>
                 <a:ext uri="{91240B29-F687-4f45-9708-019B960494DF}">
-                  <a14:hiddenLine xmlns:a14="http://schemas.microsoft.com/office/drawing/2010/main" xmlns="" w="9525">
+                  <a14:hiddenLine xmlns="" xmlns:a14="http://schemas.microsoft.com/office/drawing/2010/main" w="9525">
                     <a:solidFill>
                       <a:srgbClr val="000000"/>
                     </a:solidFill>
@@ -10507,7 +10513,7 @@
               </a:ln>
               <a:extLst>
                 <a:ext uri="{91240B29-F687-4f45-9708-019B960494DF}">
-                  <a14:hiddenLine xmlns:a14="http://schemas.microsoft.com/office/drawing/2010/main" xmlns="" w="9525">
+                  <a14:hiddenLine xmlns="" xmlns:a14="http://schemas.microsoft.com/office/drawing/2010/main" w="9525">
                     <a:solidFill>
                       <a:srgbClr val="000000"/>
                     </a:solidFill>
@@ -10572,7 +10578,7 @@
               </a:ln>
               <a:extLst>
                 <a:ext uri="{91240B29-F687-4f45-9708-019B960494DF}">
-                  <a14:hiddenLine xmlns:a14="http://schemas.microsoft.com/office/drawing/2010/main" xmlns="" w="9525">
+                  <a14:hiddenLine xmlns="" xmlns:a14="http://schemas.microsoft.com/office/drawing/2010/main" w="9525">
                     <a:solidFill>
                       <a:srgbClr val="000000"/>
                     </a:solidFill>
@@ -10634,7 +10640,7 @@
               </a:ln>
               <a:extLst>
                 <a:ext uri="{91240B29-F687-4f45-9708-019B960494DF}">
-                  <a14:hiddenLine xmlns:a14="http://schemas.microsoft.com/office/drawing/2010/main" xmlns="" w="9525">
+                  <a14:hiddenLine xmlns="" xmlns:a14="http://schemas.microsoft.com/office/drawing/2010/main" w="9525">
                     <a:solidFill>
                       <a:srgbClr val="000000"/>
                     </a:solidFill>
@@ -10724,7 +10730,7 @@
               </a:ln>
               <a:extLst>
                 <a:ext uri="{91240B29-F687-4f45-9708-019B960494DF}">
-                  <a14:hiddenLine xmlns:a14="http://schemas.microsoft.com/office/drawing/2010/main" xmlns="" w="9525">
+                  <a14:hiddenLine xmlns="" xmlns:a14="http://schemas.microsoft.com/office/drawing/2010/main" w="9525">
                     <a:solidFill>
                       <a:srgbClr val="000000"/>
                     </a:solidFill>
@@ -10814,7 +10820,7 @@
               </a:ln>
               <a:extLst>
                 <a:ext uri="{91240B29-F687-4f45-9708-019B960494DF}">
-                  <a14:hiddenLine xmlns:a14="http://schemas.microsoft.com/office/drawing/2010/main" xmlns="" w="9525">
+                  <a14:hiddenLine xmlns="" xmlns:a14="http://schemas.microsoft.com/office/drawing/2010/main" w="9525">
                     <a:solidFill>
                       <a:srgbClr val="000000"/>
                     </a:solidFill>
@@ -10879,7 +10885,7 @@
               </a:ln>
               <a:extLst>
                 <a:ext uri="{91240B29-F687-4f45-9708-019B960494DF}">
-                  <a14:hiddenLine xmlns:a14="http://schemas.microsoft.com/office/drawing/2010/main" xmlns="" w="9525">
+                  <a14:hiddenLine xmlns="" xmlns:a14="http://schemas.microsoft.com/office/drawing/2010/main" w="9525">
                     <a:solidFill>
                       <a:srgbClr val="000000"/>
                     </a:solidFill>
@@ -10999,7 +11005,7 @@
               </a:ln>
               <a:extLst>
                 <a:ext uri="{91240B29-F687-4f45-9708-019B960494DF}">
-                  <a14:hiddenLine xmlns:a14="http://schemas.microsoft.com/office/drawing/2010/main" xmlns="" w="9525">
+                  <a14:hiddenLine xmlns="" xmlns:a14="http://schemas.microsoft.com/office/drawing/2010/main" w="9525">
                     <a:solidFill>
                       <a:srgbClr val="000000"/>
                     </a:solidFill>
@@ -11097,7 +11103,7 @@
               </a:ln>
               <a:extLst>
                 <a:ext uri="{91240B29-F687-4f45-9708-019B960494DF}">
-                  <a14:hiddenLine xmlns:a14="http://schemas.microsoft.com/office/drawing/2010/main" xmlns="" w="9525">
+                  <a14:hiddenLine xmlns="" xmlns:a14="http://schemas.microsoft.com/office/drawing/2010/main" w="9525">
                     <a:solidFill>
                       <a:srgbClr val="000000"/>
                     </a:solidFill>
@@ -11212,7 +11218,7 @@
               </a:ln>
               <a:extLst>
                 <a:ext uri="{91240B29-F687-4f45-9708-019B960494DF}">
-                  <a14:hiddenLine xmlns:a14="http://schemas.microsoft.com/office/drawing/2010/main" xmlns="" w="9525">
+                  <a14:hiddenLine xmlns="" xmlns:a14="http://schemas.microsoft.com/office/drawing/2010/main" w="9525">
                     <a:solidFill>
                       <a:srgbClr val="000000"/>
                     </a:solidFill>
@@ -11302,7 +11308,7 @@
               </a:ln>
               <a:extLst>
                 <a:ext uri="{91240B29-F687-4f45-9708-019B960494DF}">
-                  <a14:hiddenLine xmlns:a14="http://schemas.microsoft.com/office/drawing/2010/main" xmlns="" w="9525">
+                  <a14:hiddenLine xmlns="" xmlns:a14="http://schemas.microsoft.com/office/drawing/2010/main" w="9525">
                     <a:solidFill>
                       <a:srgbClr val="000000"/>
                     </a:solidFill>
@@ -11367,7 +11373,7 @@
               </a:ln>
               <a:extLst>
                 <a:ext uri="{91240B29-F687-4f45-9708-019B960494DF}">
-                  <a14:hiddenLine xmlns:a14="http://schemas.microsoft.com/office/drawing/2010/main" xmlns="" w="9525">
+                  <a14:hiddenLine xmlns="" xmlns:a14="http://schemas.microsoft.com/office/drawing/2010/main" w="9525">
                     <a:solidFill>
                       <a:srgbClr val="000000"/>
                     </a:solidFill>
@@ -11457,7 +11463,7 @@
               </a:ln>
               <a:extLst>
                 <a:ext uri="{91240B29-F687-4f45-9708-019B960494DF}">
-                  <a14:hiddenLine xmlns:a14="http://schemas.microsoft.com/office/drawing/2010/main" xmlns="" w="9525">
+                  <a14:hiddenLine xmlns="" xmlns:a14="http://schemas.microsoft.com/office/drawing/2010/main" w="9525">
                     <a:solidFill>
                       <a:srgbClr val="000000"/>
                     </a:solidFill>
@@ -11525,7 +11531,7 @@
               </a:ln>
               <a:extLst>
                 <a:ext uri="{91240B29-F687-4f45-9708-019B960494DF}">
-                  <a14:hiddenLine xmlns:a14="http://schemas.microsoft.com/office/drawing/2010/main" xmlns="" w="9525">
+                  <a14:hiddenLine xmlns="" xmlns:a14="http://schemas.microsoft.com/office/drawing/2010/main" w="9525">
                     <a:solidFill>
                       <a:srgbClr val="000000"/>
                     </a:solidFill>
@@ -11615,7 +11621,7 @@
               </a:ln>
               <a:extLst>
                 <a:ext uri="{91240B29-F687-4f45-9708-019B960494DF}">
-                  <a14:hiddenLine xmlns:a14="http://schemas.microsoft.com/office/drawing/2010/main" xmlns="" w="9525">
+                  <a14:hiddenLine xmlns="" xmlns:a14="http://schemas.microsoft.com/office/drawing/2010/main" w="9525">
                     <a:solidFill>
                       <a:srgbClr val="000000"/>
                     </a:solidFill>
@@ -11683,7 +11689,7 @@
               </a:ln>
               <a:extLst>
                 <a:ext uri="{91240B29-F687-4f45-9708-019B960494DF}">
-                  <a14:hiddenLine xmlns:a14="http://schemas.microsoft.com/office/drawing/2010/main" xmlns="" w="9525">
+                  <a14:hiddenLine xmlns="" xmlns:a14="http://schemas.microsoft.com/office/drawing/2010/main" w="9525">
                     <a:solidFill>
                       <a:srgbClr val="000000"/>
                     </a:solidFill>
@@ -11773,7 +11779,7 @@
               </a:ln>
               <a:extLst>
                 <a:ext uri="{91240B29-F687-4f45-9708-019B960494DF}">
-                  <a14:hiddenLine xmlns:a14="http://schemas.microsoft.com/office/drawing/2010/main" xmlns="" w="9525">
+                  <a14:hiddenLine xmlns="" xmlns:a14="http://schemas.microsoft.com/office/drawing/2010/main" w="9525">
                     <a:solidFill>
                       <a:srgbClr val="000000"/>
                     </a:solidFill>
@@ -11807,7 +11813,7 @@
               </a:ln>
               <a:extLst>
                 <a:ext uri="{91240B29-F687-4f45-9708-019B960494DF}">
-                  <a14:hiddenLine xmlns:a14="http://schemas.microsoft.com/office/drawing/2010/main" xmlns="" w="9525">
+                  <a14:hiddenLine xmlns="" xmlns:a14="http://schemas.microsoft.com/office/drawing/2010/main" w="9525">
                     <a:solidFill>
                       <a:srgbClr val="000000"/>
                     </a:solidFill>
@@ -11948,7 +11954,7 @@
             <a:fld id="{48A87A34-81AB-432B-8DAE-1953F412C126}" type="datetimeFigureOut">
               <a:rPr lang="en-US" dirty="0"/>
               <a:pPr/>
-              <a:t>8/11/2014</a:t>
+              <a:t>8/12/2014</a:t>
             </a:fld>
             <a:endParaRPr lang="en-US" dirty="0"/>
           </a:p>
@@ -12667,7 +12673,7 @@
           <a:p>
             <a:r>
               <a:rPr lang="en-US" sz="4000" dirty="0" smtClean="0"/>
-              <a:t>Major Components </a:t>
+              <a:t>Major Components</a:t>
             </a:r>
             <a:endParaRPr lang="en-US" sz="4000" dirty="0"/>
           </a:p>
@@ -12675,7 +12681,7 @@
       </p:sp>
       <p:sp>
         <p:nvSpPr>
-          <p:cNvPr id="3" name="Content Placeholder 2"/>
+          <p:cNvPr id="5" name="Content Placeholder 4"/>
           <p:cNvSpPr>
             <a:spLocks noGrp="1"/>
           </p:cNvSpPr>
@@ -12685,31 +12691,37 @@
         </p:nvSpPr>
         <p:spPr/>
         <p:txBody>
-          <a:bodyPr>
-            <a:normAutofit/>
-          </a:bodyPr>
+          <a:bodyPr/>
           <a:lstStyle/>
           <a:p>
-            <a:r>
-              <a:rPr lang="en-US" sz="2800" dirty="0" smtClean="0"/>
-              <a:t>Control Module</a:t>
-            </a:r>
-          </a:p>
-          <a:p>
-            <a:r>
-              <a:rPr lang="en-US" sz="2800" dirty="0" smtClean="0"/>
-              <a:t>Interface</a:t>
-            </a:r>
-          </a:p>
-          <a:p>
-            <a:r>
-              <a:rPr lang="en-US" sz="2800" dirty="0" smtClean="0"/>
-              <a:t>DIMM</a:t>
-            </a:r>
-            <a:endParaRPr lang="en-US" sz="2800" dirty="0"/>
+            <a:endParaRPr lang="en-US"/>
           </a:p>
         </p:txBody>
       </p:sp>
+      <p:pic>
+        <p:nvPicPr>
+          <p:cNvPr id="6" name="Picture 5"/>
+          <p:cNvPicPr>
+            <a:picLocks noChangeAspect="1"/>
+          </p:cNvPicPr>
+          <p:nvPr/>
+        </p:nvPicPr>
+        <p:blipFill>
+          <a:blip r:embed="rId2"/>
+          <a:stretch>
+            <a:fillRect/>
+          </a:stretch>
+        </p:blipFill>
+        <p:spPr>
+          <a:xfrm>
+            <a:off x="1141412" y="1602013"/>
+            <a:ext cx="9683638" cy="4836662"/>
+          </a:xfrm>
+          <a:prstGeom prst="rect">
+            <a:avLst/>
+          </a:prstGeom>
+        </p:spPr>
+      </p:pic>
     </p:spTree>
     <p:extLst>
       <p:ext uri="{BB962C8B-B14F-4D97-AF65-F5344CB8AC3E}">
@@ -12803,10 +12815,60 @@
         </p:nvSpPr>
         <p:spPr/>
         <p:txBody>
-          <a:bodyPr/>
+          <a:bodyPr>
+            <a:normAutofit/>
+          </a:bodyPr>
           <a:lstStyle/>
           <a:p>
-            <a:endParaRPr lang="en-US"/>
+            <a:pPr marL="285750" indent="-285750">
+              <a:buFont typeface="Arial" panose="020B0604020202020204" pitchFamily="34" charset="0"/>
+              <a:buChar char="•"/>
+            </a:pPr>
+            <a:r>
+              <a:rPr lang="en-US" sz="2000" dirty="0" smtClean="0"/>
+              <a:t>Controller</a:t>
+            </a:r>
+          </a:p>
+          <a:p>
+            <a:pPr marL="285750" indent="-285750">
+              <a:buFont typeface="Arial" panose="020B0604020202020204" pitchFamily="34" charset="0"/>
+              <a:buChar char="•"/>
+            </a:pPr>
+            <a:r>
+              <a:rPr lang="en-US" sz="2000" dirty="0" smtClean="0"/>
+              <a:t>Burst Activate</a:t>
+            </a:r>
+          </a:p>
+          <a:p>
+            <a:pPr marL="285750" indent="-285750">
+              <a:buFont typeface="Arial" panose="020B0604020202020204" pitchFamily="34" charset="0"/>
+              <a:buChar char="•"/>
+            </a:pPr>
+            <a:r>
+              <a:rPr lang="en-US" sz="2000" dirty="0" smtClean="0"/>
+              <a:t>Burst CAS</a:t>
+            </a:r>
+          </a:p>
+          <a:p>
+            <a:pPr marL="285750" indent="-285750">
+              <a:buFont typeface="Arial" panose="020B0604020202020204" pitchFamily="34" charset="0"/>
+              <a:buChar char="•"/>
+            </a:pPr>
+            <a:r>
+              <a:rPr lang="en-US" sz="2000" dirty="0" smtClean="0"/>
+              <a:t>Burst R/W</a:t>
+            </a:r>
+          </a:p>
+          <a:p>
+            <a:pPr marL="285750" indent="-285750">
+              <a:buFont typeface="Arial" panose="020B0604020202020204" pitchFamily="34" charset="0"/>
+              <a:buChar char="•"/>
+            </a:pPr>
+            <a:r>
+              <a:rPr lang="en-US" sz="2000" dirty="0" smtClean="0"/>
+              <a:t>Burst Data</a:t>
+            </a:r>
+            <a:endParaRPr lang="en-US" sz="2000" dirty="0"/>
           </a:p>
         </p:txBody>
       </p:sp>
@@ -12860,7 +12922,11 @@
             <a:pPr algn="ctr"/>
             <a:r>
               <a:rPr lang="en-US" sz="4000" dirty="0" smtClean="0"/>
-              <a:t>Interface</a:t>
+              <a:t>Interfaces</a:t>
+            </a:r>
+            <a:r>
+              <a:rPr lang="en-US" sz="4000" dirty="0" smtClean="0"/>
+              <a:t/>
             </a:r>
             <a:br>
               <a:rPr lang="en-US" sz="4000" dirty="0" smtClean="0"/>
@@ -12869,25 +12935,32 @@
           </a:p>
         </p:txBody>
       </p:sp>
-      <p:sp>
-        <p:nvSpPr>
-          <p:cNvPr id="3" name="Content Placeholder 2"/>
-          <p:cNvSpPr>
-            <a:spLocks noGrp="1"/>
-          </p:cNvSpPr>
+      <p:pic>
+        <p:nvPicPr>
+          <p:cNvPr id="5" name="Content Placeholder 4"/>
+          <p:cNvPicPr>
+            <a:picLocks noGrp="1" noChangeAspect="1"/>
+          </p:cNvPicPr>
           <p:nvPr>
             <p:ph idx="1"/>
           </p:nvPr>
-        </p:nvSpPr>
-        <p:spPr/>
-        <p:txBody>
-          <a:bodyPr/>
-          <a:lstStyle/>
-          <a:p>
-            <a:endParaRPr lang="en-US"/>
-          </a:p>
-        </p:txBody>
-      </p:sp>
+        </p:nvPicPr>
+        <p:blipFill>
+          <a:blip r:embed="rId2"/>
+          <a:stretch>
+            <a:fillRect/>
+          </a:stretch>
+        </p:blipFill>
+        <p:spPr>
+          <a:xfrm>
+            <a:off x="5786849" y="772443"/>
+            <a:ext cx="3651121" cy="5199062"/>
+          </a:xfrm>
+          <a:prstGeom prst="rect">
+            <a:avLst/>
+          </a:prstGeom>
+        </p:spPr>
+      </p:pic>
       <p:sp>
         <p:nvSpPr>
           <p:cNvPr id="4" name="Text Placeholder 3"/>
@@ -12900,10 +12973,40 @@
         </p:nvSpPr>
         <p:spPr/>
         <p:txBody>
-          <a:bodyPr/>
+          <a:bodyPr>
+            <a:normAutofit/>
+          </a:bodyPr>
           <a:lstStyle/>
           <a:p>
-            <a:endParaRPr lang="en-US"/>
+            <a:pPr marL="342900" indent="-342900">
+              <a:buFont typeface="Arial" panose="020B0604020202020204" pitchFamily="34" charset="0"/>
+              <a:buChar char="•"/>
+            </a:pPr>
+            <a:r>
+              <a:rPr lang="en-US" sz="2800" dirty="0" smtClean="0"/>
+              <a:t>DDR</a:t>
+            </a:r>
+          </a:p>
+          <a:p>
+            <a:pPr marL="342900" indent="-342900">
+              <a:buFont typeface="Arial" panose="020B0604020202020204" pitchFamily="34" charset="0"/>
+              <a:buChar char="•"/>
+            </a:pPr>
+            <a:r>
+              <a:rPr lang="en-US" sz="2800" dirty="0" smtClean="0"/>
+              <a:t>Control </a:t>
+            </a:r>
+          </a:p>
+          <a:p>
+            <a:pPr marL="342900" indent="-342900">
+              <a:buFont typeface="Arial" panose="020B0604020202020204" pitchFamily="34" charset="0"/>
+              <a:buChar char="•"/>
+            </a:pPr>
+            <a:r>
+              <a:rPr lang="en-US" sz="2800" dirty="0" smtClean="0"/>
+              <a:t>Testbench</a:t>
+            </a:r>
+            <a:endParaRPr lang="en-US" sz="2800" dirty="0"/>
           </a:p>
         </p:txBody>
       </p:sp>
@@ -13008,10 +13111,26 @@
         </p:nvSpPr>
         <p:spPr/>
         <p:txBody>
-          <a:bodyPr/>
+          <a:bodyPr>
+            <a:normAutofit/>
+          </a:bodyPr>
           <a:lstStyle/>
           <a:p>
-            <a:endParaRPr lang="en-US" dirty="0"/>
+            <a:pPr marL="342900" indent="-342900">
+              <a:buFont typeface="Arial" panose="020B0604020202020204" pitchFamily="34" charset="0"/>
+              <a:buChar char="•"/>
+            </a:pPr>
+            <a:r>
+              <a:rPr lang="en-US" sz="2000" dirty="0" smtClean="0"/>
+              <a:t>4GB Model</a:t>
+            </a:r>
+          </a:p>
+          <a:p>
+            <a:pPr marL="342900" indent="-342900">
+              <a:buFont typeface="Arial" panose="020B0604020202020204" pitchFamily="34" charset="0"/>
+              <a:buChar char="•"/>
+            </a:pPr>
+            <a:endParaRPr lang="en-US" sz="2000" dirty="0"/>
           </a:p>
         </p:txBody>
       </p:sp>
@@ -13162,31 +13281,16 @@
             <a:pPr algn="ctr"/>
             <a:r>
               <a:rPr lang="en-US" sz="4000" dirty="0" smtClean="0"/>
-              <a:t>Testbench</a:t>
+              <a:t>Test Stimulus</a:t>
+            </a:r>
+            <a:r>
+              <a:rPr lang="en-US" sz="4000" dirty="0" smtClean="0"/>
+              <a:t/>
             </a:r>
             <a:br>
               <a:rPr lang="en-US" sz="4000" dirty="0" smtClean="0"/>
             </a:br>
             <a:endParaRPr lang="en-US" sz="4000" dirty="0"/>
-          </a:p>
-        </p:txBody>
-      </p:sp>
-      <p:sp>
-        <p:nvSpPr>
-          <p:cNvPr id="3" name="Content Placeholder 2"/>
-          <p:cNvSpPr>
-            <a:spLocks noGrp="1"/>
-          </p:cNvSpPr>
-          <p:nvPr>
-            <p:ph idx="1"/>
-          </p:nvPr>
-        </p:nvSpPr>
-        <p:spPr/>
-        <p:txBody>
-          <a:bodyPr/>
-          <a:lstStyle/>
-          <a:p>
-            <a:endParaRPr lang="en-US"/>
           </a:p>
         </p:txBody>
       </p:sp>
@@ -13200,12 +13304,356 @@
             <p:ph type="body" sz="half" idx="2"/>
           </p:nvPr>
         </p:nvSpPr>
-        <p:spPr/>
+        <p:spPr>
+          <a:xfrm>
+            <a:off x="914884" y="2249486"/>
+            <a:ext cx="5279854" cy="3541714"/>
+          </a:xfrm>
+        </p:spPr>
         <p:txBody>
-          <a:bodyPr/>
+          <a:bodyPr>
+            <a:normAutofit/>
+          </a:bodyPr>
           <a:lstStyle/>
           <a:p>
-            <a:endParaRPr lang="en-US" dirty="0"/>
+            <a:pPr lvl="1"/>
+            <a:r>
+              <a:rPr lang="en-US" sz="2800" b="1" dirty="0" smtClean="0"/>
+              <a:t>Direct</a:t>
+            </a:r>
+            <a:r>
+              <a:rPr lang="en-US" sz="2800" dirty="0" smtClean="0"/>
+              <a:t> </a:t>
+            </a:r>
+          </a:p>
+          <a:p>
+            <a:pPr marL="1200150" lvl="2" indent="-285750">
+              <a:buFont typeface="Arial" panose="020B0604020202020204" pitchFamily="34" charset="0"/>
+              <a:buChar char="•"/>
+            </a:pPr>
+            <a:r>
+              <a:rPr lang="en-US" sz="2000" dirty="0" smtClean="0"/>
+              <a:t>Corners of DIMM, every group, every bank</a:t>
+            </a:r>
+          </a:p>
+          <a:p>
+            <a:pPr marL="1200150" lvl="2" indent="-285750">
+              <a:buFont typeface="Arial" panose="020B0604020202020204" pitchFamily="34" charset="0"/>
+              <a:buChar char="•"/>
+            </a:pPr>
+            <a:r>
+              <a:rPr lang="en-US" sz="2000" dirty="0" smtClean="0"/>
+              <a:t>Consecutive writes same row followed by write to different row in same bank</a:t>
+            </a:r>
+          </a:p>
+          <a:p>
+            <a:pPr marL="1200150" lvl="2" indent="-285750">
+              <a:buFont typeface="Arial" panose="020B0604020202020204" pitchFamily="34" charset="0"/>
+              <a:buChar char="•"/>
+            </a:pPr>
+            <a:r>
+              <a:rPr lang="en-US" sz="2000" dirty="0"/>
+              <a:t>Consecutive </a:t>
+            </a:r>
+            <a:r>
+              <a:rPr lang="en-US" sz="2000" dirty="0" smtClean="0"/>
+              <a:t>reads </a:t>
+            </a:r>
+            <a:r>
+              <a:rPr lang="en-US" sz="2000" dirty="0"/>
+              <a:t>same row followed by </a:t>
+            </a:r>
+            <a:r>
+              <a:rPr lang="en-US" sz="2000" dirty="0" smtClean="0"/>
+              <a:t>read </a:t>
+            </a:r>
+            <a:r>
+              <a:rPr lang="en-US" sz="2000" dirty="0"/>
+              <a:t>to different row in same </a:t>
+            </a:r>
+            <a:r>
+              <a:rPr lang="en-US" sz="2000" dirty="0" smtClean="0"/>
+              <a:t>bank</a:t>
+            </a:r>
+          </a:p>
+        </p:txBody>
+      </p:sp>
+      <p:sp>
+        <p:nvSpPr>
+          <p:cNvPr id="7" name="Text Placeholder 3"/>
+          <p:cNvSpPr txBox="1">
+            <a:spLocks/>
+          </p:cNvSpPr>
+          <p:nvPr/>
+        </p:nvSpPr>
+        <p:spPr>
+          <a:xfrm>
+            <a:off x="6078827" y="2249486"/>
+            <a:ext cx="5318976" cy="3541714"/>
+          </a:xfrm>
+          <a:prstGeom prst="rect">
+            <a:avLst/>
+          </a:prstGeom>
+        </p:spPr>
+        <p:txBody>
+          <a:bodyPr vert="horz" lIns="91440" tIns="45720" rIns="91440" bIns="45720" rtlCol="0">
+            <a:normAutofit/>
+          </a:bodyPr>
+          <a:lstStyle>
+            <a:lvl1pPr marL="0" indent="0" algn="l" defTabSz="914400" rtl="0" eaLnBrk="1" latinLnBrk="0" hangingPunct="1">
+              <a:lnSpc>
+                <a:spcPct val="120000"/>
+              </a:lnSpc>
+              <a:spcBef>
+                <a:spcPts val="1000"/>
+              </a:spcBef>
+              <a:buSzPct val="125000"/>
+              <a:buFont typeface="Arial" panose="020B0604020202020204" pitchFamily="34" charset="0"/>
+              <a:buNone/>
+              <a:defRPr sz="1600" kern="1200">
+                <a:solidFill>
+                  <a:schemeClr val="tx1"/>
+                </a:solidFill>
+                <a:effectLst>
+                  <a:outerShdw blurRad="152400" dist="38100" dir="2700000" algn="tl">
+                    <a:srgbClr val="000000">
+                      <a:alpha val="36000"/>
+                    </a:srgbClr>
+                  </a:outerShdw>
+                </a:effectLst>
+                <a:latin typeface="+mn-lt"/>
+                <a:ea typeface="+mn-ea"/>
+                <a:cs typeface="+mn-cs"/>
+              </a:defRPr>
+            </a:lvl1pPr>
+            <a:lvl2pPr marL="457200" indent="0" algn="l" defTabSz="914400" rtl="0" eaLnBrk="1" latinLnBrk="0" hangingPunct="1">
+              <a:lnSpc>
+                <a:spcPct val="120000"/>
+              </a:lnSpc>
+              <a:spcBef>
+                <a:spcPts val="500"/>
+              </a:spcBef>
+              <a:buSzPct val="125000"/>
+              <a:buFont typeface="Arial" panose="020B0604020202020204" pitchFamily="34" charset="0"/>
+              <a:buNone/>
+              <a:defRPr sz="1400" kern="1200">
+                <a:solidFill>
+                  <a:schemeClr val="tx1"/>
+                </a:solidFill>
+                <a:effectLst>
+                  <a:outerShdw blurRad="152400" dist="38100" dir="2700000" algn="tl">
+                    <a:srgbClr val="000000">
+                      <a:alpha val="36000"/>
+                    </a:srgbClr>
+                  </a:outerShdw>
+                </a:effectLst>
+                <a:latin typeface="+mn-lt"/>
+                <a:ea typeface="+mn-ea"/>
+                <a:cs typeface="+mn-cs"/>
+              </a:defRPr>
+            </a:lvl2pPr>
+            <a:lvl3pPr marL="914400" indent="0" algn="l" defTabSz="914400" rtl="0" eaLnBrk="1" latinLnBrk="0" hangingPunct="1">
+              <a:lnSpc>
+                <a:spcPct val="120000"/>
+              </a:lnSpc>
+              <a:spcBef>
+                <a:spcPts val="500"/>
+              </a:spcBef>
+              <a:buSzPct val="125000"/>
+              <a:buFont typeface="Arial" panose="020B0604020202020204" pitchFamily="34" charset="0"/>
+              <a:buNone/>
+              <a:defRPr sz="1200" kern="1200">
+                <a:solidFill>
+                  <a:schemeClr val="tx1"/>
+                </a:solidFill>
+                <a:effectLst>
+                  <a:outerShdw blurRad="152400" dist="38100" dir="2700000" algn="tl">
+                    <a:srgbClr val="000000">
+                      <a:alpha val="36000"/>
+                    </a:srgbClr>
+                  </a:outerShdw>
+                </a:effectLst>
+                <a:latin typeface="+mn-lt"/>
+                <a:ea typeface="+mn-ea"/>
+                <a:cs typeface="+mn-cs"/>
+              </a:defRPr>
+            </a:lvl3pPr>
+            <a:lvl4pPr marL="1371600" indent="0" algn="l" defTabSz="914400" rtl="0" eaLnBrk="1" latinLnBrk="0" hangingPunct="1">
+              <a:lnSpc>
+                <a:spcPct val="120000"/>
+              </a:lnSpc>
+              <a:spcBef>
+                <a:spcPts val="500"/>
+              </a:spcBef>
+              <a:buSzPct val="125000"/>
+              <a:buFont typeface="Arial" panose="020B0604020202020204" pitchFamily="34" charset="0"/>
+              <a:buNone/>
+              <a:defRPr sz="1000" kern="1200">
+                <a:solidFill>
+                  <a:schemeClr val="tx1"/>
+                </a:solidFill>
+                <a:effectLst>
+                  <a:outerShdw blurRad="152400" dist="38100" dir="2700000" algn="tl">
+                    <a:srgbClr val="000000">
+                      <a:alpha val="36000"/>
+                    </a:srgbClr>
+                  </a:outerShdw>
+                </a:effectLst>
+                <a:latin typeface="+mn-lt"/>
+                <a:ea typeface="+mn-ea"/>
+                <a:cs typeface="+mn-cs"/>
+              </a:defRPr>
+            </a:lvl4pPr>
+            <a:lvl5pPr marL="1828800" indent="0" algn="l" defTabSz="914400" rtl="0" eaLnBrk="1" latinLnBrk="0" hangingPunct="1">
+              <a:lnSpc>
+                <a:spcPct val="120000"/>
+              </a:lnSpc>
+              <a:spcBef>
+                <a:spcPts val="500"/>
+              </a:spcBef>
+              <a:buSzPct val="125000"/>
+              <a:buFont typeface="Arial" panose="020B0604020202020204" pitchFamily="34" charset="0"/>
+              <a:buNone/>
+              <a:defRPr sz="1000" kern="1200">
+                <a:solidFill>
+                  <a:schemeClr val="tx1"/>
+                </a:solidFill>
+                <a:effectLst>
+                  <a:outerShdw blurRad="152400" dist="38100" dir="2700000" algn="tl">
+                    <a:srgbClr val="000000">
+                      <a:alpha val="36000"/>
+                    </a:srgbClr>
+                  </a:outerShdw>
+                </a:effectLst>
+                <a:latin typeface="+mn-lt"/>
+                <a:ea typeface="+mn-ea"/>
+                <a:cs typeface="+mn-cs"/>
+              </a:defRPr>
+            </a:lvl5pPr>
+            <a:lvl6pPr marL="2286000" indent="0" algn="l" defTabSz="914400" rtl="0" eaLnBrk="1" latinLnBrk="0" hangingPunct="1">
+              <a:lnSpc>
+                <a:spcPct val="120000"/>
+              </a:lnSpc>
+              <a:spcBef>
+                <a:spcPts val="500"/>
+              </a:spcBef>
+              <a:buSzPct val="125000"/>
+              <a:buFont typeface="Arial" panose="020B0604020202020204" pitchFamily="34" charset="0"/>
+              <a:buNone/>
+              <a:defRPr sz="1000" kern="1200">
+                <a:solidFill>
+                  <a:schemeClr val="tx1"/>
+                </a:solidFill>
+                <a:latin typeface="+mn-lt"/>
+                <a:ea typeface="+mn-ea"/>
+                <a:cs typeface="+mn-cs"/>
+              </a:defRPr>
+            </a:lvl6pPr>
+            <a:lvl7pPr marL="2743200" indent="0" algn="l" defTabSz="914400" rtl="0" eaLnBrk="1" latinLnBrk="0" hangingPunct="1">
+              <a:lnSpc>
+                <a:spcPct val="120000"/>
+              </a:lnSpc>
+              <a:spcBef>
+                <a:spcPts val="500"/>
+              </a:spcBef>
+              <a:buSzPct val="125000"/>
+              <a:buFont typeface="Arial" panose="020B0604020202020204" pitchFamily="34" charset="0"/>
+              <a:buNone/>
+              <a:defRPr sz="1000" kern="1200">
+                <a:solidFill>
+                  <a:schemeClr val="tx1"/>
+                </a:solidFill>
+                <a:latin typeface="+mn-lt"/>
+                <a:ea typeface="+mn-ea"/>
+                <a:cs typeface="+mn-cs"/>
+              </a:defRPr>
+            </a:lvl7pPr>
+            <a:lvl8pPr marL="3200400" indent="0" algn="l" defTabSz="914400" rtl="0" eaLnBrk="1" latinLnBrk="0" hangingPunct="1">
+              <a:lnSpc>
+                <a:spcPct val="120000"/>
+              </a:lnSpc>
+              <a:spcBef>
+                <a:spcPts val="500"/>
+              </a:spcBef>
+              <a:buSzPct val="125000"/>
+              <a:buFont typeface="Arial" panose="020B0604020202020204" pitchFamily="34" charset="0"/>
+              <a:buNone/>
+              <a:defRPr sz="1000" kern="1200">
+                <a:solidFill>
+                  <a:schemeClr val="tx1"/>
+                </a:solidFill>
+                <a:latin typeface="+mn-lt"/>
+                <a:ea typeface="+mn-ea"/>
+                <a:cs typeface="+mn-cs"/>
+              </a:defRPr>
+            </a:lvl8pPr>
+            <a:lvl9pPr marL="3657600" indent="0" algn="l" defTabSz="914400" rtl="0" eaLnBrk="1" latinLnBrk="0" hangingPunct="1">
+              <a:lnSpc>
+                <a:spcPct val="120000"/>
+              </a:lnSpc>
+              <a:spcBef>
+                <a:spcPts val="500"/>
+              </a:spcBef>
+              <a:buSzPct val="125000"/>
+              <a:buFont typeface="Arial" panose="020B0604020202020204" pitchFamily="34" charset="0"/>
+              <a:buNone/>
+              <a:defRPr sz="1000" kern="1200">
+                <a:solidFill>
+                  <a:schemeClr val="tx1"/>
+                </a:solidFill>
+                <a:latin typeface="+mn-lt"/>
+                <a:ea typeface="+mn-ea"/>
+                <a:cs typeface="+mn-cs"/>
+              </a:defRPr>
+            </a:lvl9pPr>
+          </a:lstStyle>
+          <a:p>
+            <a:pPr lvl="1"/>
+            <a:r>
+              <a:rPr lang="en-US" sz="2800" b="1" dirty="0" smtClean="0"/>
+              <a:t>Randomized </a:t>
+            </a:r>
+          </a:p>
+          <a:p>
+            <a:pPr marL="1200150" lvl="2" indent="-285750">
+              <a:buFont typeface="Arial" panose="020B0604020202020204" pitchFamily="34" charset="0"/>
+              <a:buChar char="•"/>
+            </a:pPr>
+            <a:r>
+              <a:rPr lang="en-US" sz="2000" dirty="0" smtClean="0"/>
+              <a:t>2 Classes</a:t>
+            </a:r>
+          </a:p>
+          <a:p>
+            <a:pPr marL="1200150" lvl="2" indent="-285750">
+              <a:buFont typeface="Arial" panose="020B0604020202020204" pitchFamily="34" charset="0"/>
+              <a:buChar char="•"/>
+            </a:pPr>
+            <a:r>
+              <a:rPr lang="en-US" sz="2000" dirty="0" smtClean="0"/>
+              <a:t>Constraints for op code </a:t>
+            </a:r>
+          </a:p>
+          <a:p>
+            <a:pPr marL="1200150" lvl="2" indent="-285750">
+              <a:buFont typeface="Arial" panose="020B0604020202020204" pitchFamily="34" charset="0"/>
+              <a:buChar char="•"/>
+            </a:pPr>
+            <a:r>
+              <a:rPr lang="en-US" sz="2000" dirty="0" smtClean="0"/>
+              <a:t>50/50 – R/W distribution</a:t>
+            </a:r>
+          </a:p>
+          <a:p>
+            <a:pPr marL="1200150" lvl="2" indent="-285750">
+              <a:buFont typeface="Arial" panose="020B0604020202020204" pitchFamily="34" charset="0"/>
+              <a:buChar char="•"/>
+            </a:pPr>
+            <a:r>
+              <a:rPr lang="en-US" sz="2000" dirty="0" smtClean="0"/>
+              <a:t>Ensure that we only read from address that we have previously written to. </a:t>
+            </a:r>
+            <a:endParaRPr lang="en-US" sz="2000" dirty="0"/>
           </a:p>
         </p:txBody>
       </p:sp>
@@ -13213,6 +13661,79 @@
     <p:extLst>
       <p:ext uri="{BB962C8B-B14F-4D97-AF65-F5344CB8AC3E}">
         <p14:creationId xmlns:p14="http://schemas.microsoft.com/office/powerpoint/2010/main" val="2410678530"/>
+      </p:ext>
+    </p:extLst>
+  </p:cSld>
+  <p:clrMapOvr>
+    <a:masterClrMapping/>
+  </p:clrMapOvr>
+</p:sld>
+</file>
+
+<file path=ppt/slides/slide9.xml><?xml version="1.0" encoding="utf-8"?>
+<p:sld xmlns:a="http://schemas.openxmlformats.org/drawingml/2006/main" xmlns:r="http://schemas.openxmlformats.org/officeDocument/2006/relationships" xmlns:p="http://schemas.openxmlformats.org/presentationml/2006/main">
+  <p:cSld>
+    <p:spTree>
+      <p:nvGrpSpPr>
+        <p:cNvPr id="1" name=""/>
+        <p:cNvGrpSpPr/>
+        <p:nvPr/>
+      </p:nvGrpSpPr>
+      <p:grpSpPr>
+        <a:xfrm>
+          <a:off x="0" y="0"/>
+          <a:ext cx="0" cy="0"/>
+          <a:chOff x="0" y="0"/>
+          <a:chExt cx="0" cy="0"/>
+        </a:xfrm>
+      </p:grpSpPr>
+      <p:sp>
+        <p:nvSpPr>
+          <p:cNvPr id="2" name="Title 1"/>
+          <p:cNvSpPr>
+            <a:spLocks noGrp="1"/>
+          </p:cNvSpPr>
+          <p:nvPr>
+            <p:ph type="ctrTitle"/>
+          </p:nvPr>
+        </p:nvSpPr>
+        <p:spPr/>
+        <p:txBody>
+          <a:bodyPr/>
+          <a:lstStyle/>
+          <a:p>
+            <a:pPr algn="ctr"/>
+            <a:r>
+              <a:rPr lang="en-US" b="1" dirty="0" smtClean="0"/>
+              <a:t>Questions?</a:t>
+            </a:r>
+            <a:endParaRPr lang="en-US" b="1" dirty="0"/>
+          </a:p>
+        </p:txBody>
+      </p:sp>
+      <p:sp>
+        <p:nvSpPr>
+          <p:cNvPr id="3" name="Subtitle 2"/>
+          <p:cNvSpPr>
+            <a:spLocks noGrp="1"/>
+          </p:cNvSpPr>
+          <p:nvPr>
+            <p:ph type="subTitle" idx="1"/>
+          </p:nvPr>
+        </p:nvSpPr>
+        <p:spPr/>
+        <p:txBody>
+          <a:bodyPr/>
+          <a:lstStyle/>
+          <a:p>
+            <a:endParaRPr lang="en-US"/>
+          </a:p>
+        </p:txBody>
+      </p:sp>
+    </p:spTree>
+    <p:extLst>
+      <p:ext uri="{BB962C8B-B14F-4D97-AF65-F5344CB8AC3E}">
+        <p14:creationId xmlns:p14="http://schemas.microsoft.com/office/powerpoint/2010/main" val="920268024"/>
       </p:ext>
     </p:extLst>
   </p:cSld>

</xml_diff>